<commit_message>
Add BE-02 Random Joke
</commit_message>
<xml_diff>
--- a/Docs/stopnorris.pptx
+++ b/Docs/stopnorris.pptx
@@ -293,7 +293,7 @@
             <a:fld id="{87DE6118-2437-4B30-8E3C-4D2BE6020583}" type="datetimeFigureOut">
               <a:rPr lang="en-US" dirty="0"/>
               <a:pPr/>
-              <a:t>2021-09-06</a:t>
+              <a:t>2021-09-07</a:t>
             </a:fld>
             <a:endParaRPr lang="en-US" dirty="0"/>
           </a:p>
@@ -619,7 +619,7 @@
           <a:p>
             <a:fld id="{87DE6118-2437-4B30-8E3C-4D2BE6020583}" type="datetimeFigureOut">
               <a:rPr lang="en-US" dirty="0"/>
-              <a:t>2021-09-06</a:t>
+              <a:t>2021-09-07</a:t>
             </a:fld>
             <a:endParaRPr lang="en-US" dirty="0"/>
           </a:p>
@@ -794,7 +794,7 @@
           <a:p>
             <a:fld id="{87DE6118-2437-4B30-8E3C-4D2BE6020583}" type="datetimeFigureOut">
               <a:rPr lang="en-US" dirty="0"/>
-              <a:t>2021-09-06</a:t>
+              <a:t>2021-09-07</a:t>
             </a:fld>
             <a:endParaRPr lang="en-US" dirty="0"/>
           </a:p>
@@ -959,7 +959,7 @@
           <a:p>
             <a:fld id="{87DE6118-2437-4B30-8E3C-4D2BE6020583}" type="datetimeFigureOut">
               <a:rPr lang="en-US" dirty="0"/>
-              <a:t>2021-09-06</a:t>
+              <a:t>2021-09-07</a:t>
             </a:fld>
             <a:endParaRPr lang="en-US" dirty="0"/>
           </a:p>
@@ -1232,7 +1232,7 @@
             <a:fld id="{87DE6118-2437-4B30-8E3C-4D2BE6020583}" type="datetimeFigureOut">
               <a:rPr lang="en-US" dirty="0"/>
               <a:pPr/>
-              <a:t>2021-09-06</a:t>
+              <a:t>2021-09-07</a:t>
             </a:fld>
             <a:endParaRPr lang="en-US" dirty="0"/>
           </a:p>
@@ -1622,7 +1622,7 @@
           <a:p>
             <a:fld id="{87DE6118-2437-4B30-8E3C-4D2BE6020583}" type="datetimeFigureOut">
               <a:rPr lang="en-US" dirty="0"/>
-              <a:t>2021-09-06</a:t>
+              <a:t>2021-09-07</a:t>
             </a:fld>
             <a:endParaRPr lang="en-US" dirty="0"/>
           </a:p>
@@ -2094,7 +2094,7 @@
           <a:p>
             <a:fld id="{87DE6118-2437-4B30-8E3C-4D2BE6020583}" type="datetimeFigureOut">
               <a:rPr lang="en-US" dirty="0"/>
-              <a:t>2021-09-06</a:t>
+              <a:t>2021-09-07</a:t>
             </a:fld>
             <a:endParaRPr lang="en-US" dirty="0"/>
           </a:p>
@@ -2207,7 +2207,7 @@
           <a:p>
             <a:fld id="{87DE6118-2437-4B30-8E3C-4D2BE6020583}" type="datetimeFigureOut">
               <a:rPr lang="en-US" dirty="0"/>
-              <a:t>2021-09-06</a:t>
+              <a:t>2021-09-07</a:t>
             </a:fld>
             <a:endParaRPr lang="en-US" dirty="0"/>
           </a:p>
@@ -2297,7 +2297,7 @@
           <a:p>
             <a:fld id="{87DE6118-2437-4B30-8E3C-4D2BE6020583}" type="datetimeFigureOut">
               <a:rPr lang="en-US" dirty="0"/>
-              <a:t>2021-09-06</a:t>
+              <a:t>2021-09-07</a:t>
             </a:fld>
             <a:endParaRPr lang="en-US" dirty="0"/>
           </a:p>
@@ -2639,7 +2639,7 @@
             <a:fld id="{87DE6118-2437-4B30-8E3C-4D2BE6020583}" type="datetimeFigureOut">
               <a:rPr lang="en-US" dirty="0"/>
               <a:pPr/>
-              <a:t>2021-09-06</a:t>
+              <a:t>2021-09-07</a:t>
             </a:fld>
             <a:endParaRPr lang="en-US" dirty="0"/>
           </a:p>
@@ -3024,7 +3024,7 @@
             <a:fld id="{87DE6118-2437-4B30-8E3C-4D2BE6020583}" type="datetimeFigureOut">
               <a:rPr lang="en-US" dirty="0"/>
               <a:pPr/>
-              <a:t>2021-09-06</a:t>
+              <a:t>2021-09-07</a:t>
             </a:fld>
             <a:endParaRPr lang="en-US" dirty="0"/>
           </a:p>
@@ -3299,7 +3299,7 @@
             <a:fld id="{87DE6118-2437-4B30-8E3C-4D2BE6020583}" type="datetimeFigureOut">
               <a:rPr lang="en-US" dirty="0"/>
               <a:pPr/>
-              <a:t>2021-09-06</a:t>
+              <a:t>2021-09-07</a:t>
             </a:fld>
             <a:endParaRPr lang="en-US" dirty="0"/>
           </a:p>
@@ -4183,14 +4183,14 @@
           <p:nvPr>
             <p:extLst>
               <p:ext uri="{D42A27DB-BD31-4B8C-83A1-F6EECF244321}">
-                <p14:modId xmlns:p14="http://schemas.microsoft.com/office/powerpoint/2010/main" val="1473632993"/>
+                <p14:modId xmlns:p14="http://schemas.microsoft.com/office/powerpoint/2010/main" val="849996814"/>
               </p:ext>
             </p:extLst>
           </p:nvPr>
         </p:nvGraphicFramePr>
         <p:xfrm>
           <a:off x="1371599" y="2560950"/>
-          <a:ext cx="9601197" cy="2839720"/>
+          <a:ext cx="9601197" cy="3205480"/>
         </p:xfrm>
         <a:graphic>
           <a:graphicData uri="http://schemas.openxmlformats.org/drawingml/2006/table">
@@ -4498,6 +4498,35 @@
                         <a:rPr lang="en-US" sz="1200" b="1" dirty="0" err="1"/>
                         <a:t>empty_array</a:t>
                       </a:r>
+                      <a:endParaRPr lang="en-US" sz="1200" b="1" dirty="0"/>
+                    </a:p>
+                    <a:p>
+                      <a:r>
+                        <a:rPr lang="en-US" sz="1200" b="1" kern="1200" dirty="0">
+                          <a:solidFill>
+                            <a:schemeClr val="dk1"/>
+                          </a:solidFill>
+                          <a:effectLst/>
+                          <a:latin typeface="+mn-lt"/>
+                          <a:ea typeface="+mn-ea"/>
+                          <a:cs typeface="+mn-cs"/>
+                        </a:rPr>
+                        <a:t>                          OR</a:t>
+                      </a:r>
+                    </a:p>
+                    <a:p>
+                      <a:r>
+                        <a:rPr lang="en-US" sz="1200" b="1" kern="1200" dirty="0">
+                          <a:solidFill>
+                            <a:schemeClr val="dk1"/>
+                          </a:solidFill>
+                          <a:effectLst/>
+                          <a:latin typeface="+mn-lt"/>
+                          <a:ea typeface="+mn-ea"/>
+                          <a:cs typeface="+mn-cs"/>
+                        </a:rPr>
+                        <a:t>                          $category</a:t>
+                      </a:r>
                       <a:r>
                         <a:rPr lang="en-US" sz="1200" kern="1200" dirty="0">
                           <a:solidFill>
@@ -4919,6 +4948,36 @@
                     </a:p>
                     <a:p>
                       <a:r>
+                        <a:rPr lang="en-US" sz="1200" b="1" kern="1200" dirty="0">
+                          <a:solidFill>
+                            <a:schemeClr val="dk1"/>
+                          </a:solidFill>
+                          <a:effectLst/>
+                          <a:latin typeface="+mn-lt"/>
+                          <a:ea typeface="+mn-ea"/>
+                          <a:cs typeface="+mn-cs"/>
+                        </a:rPr>
+                        <a:t>$category</a:t>
+                      </a:r>
+                      <a:r>
+                        <a:rPr lang="en-US" sz="1200" b="0" kern="1200" dirty="0">
+                          <a:solidFill>
+                            <a:schemeClr val="dk1"/>
+                          </a:solidFill>
+                          <a:effectLst/>
+                          <a:latin typeface="+mn-lt"/>
+                          <a:ea typeface="+mn-ea"/>
+                          <a:cs typeface="+mn-cs"/>
+                        </a:rPr>
+                        <a:t>(1 from category list)</a:t>
+                      </a:r>
+                      <a:endParaRPr lang="en-US" sz="1200" b="0" dirty="0"/>
+                    </a:p>
+                    <a:p>
+                      <a:endParaRPr lang="en-US" sz="1200" dirty="0"/>
+                    </a:p>
+                    <a:p>
+                      <a:r>
                         <a:rPr lang="en-US" sz="1200" b="1" dirty="0"/>
                         <a:t>$</a:t>
                       </a:r>
@@ -5019,7 +5078,7 @@
                           <a:ea typeface="+mn-ea"/>
                           <a:cs typeface="+mn-cs"/>
                         </a:rPr>
-                        <a:t>"%Y-%m-%d %H:%M:%</a:t>
+                        <a:t>'%Y-%m-%d %H:%M:%</a:t>
                       </a:r>
                       <a:r>
                         <a:rPr lang="en-US" sz="1200" kern="1200" dirty="0" err="1">
@@ -5043,7 +5102,39 @@
                           <a:ea typeface="+mn-ea"/>
                           <a:cs typeface="+mn-cs"/>
                         </a:rPr>
-                        <a:t>')[:-6]“)</a:t>
+                        <a:t>'</a:t>
+                      </a:r>
+                      <a:r>
+                        <a:rPr lang="en-US" sz="1200" dirty="0"/>
+                        <a:t>)[:-</a:t>
+                      </a:r>
+                      <a:r>
+                        <a:rPr lang="en-US" sz="1200" kern="1200" dirty="0">
+                          <a:solidFill>
+                            <a:schemeClr val="dk1"/>
+                          </a:solidFill>
+                          <a:effectLst/>
+                          <a:latin typeface="+mn-lt"/>
+                          <a:ea typeface="+mn-ea"/>
+                          <a:cs typeface="+mn-cs"/>
+                        </a:rPr>
+                        <a:t>6</a:t>
+                      </a:r>
+                      <a:r>
+                        <a:rPr lang="en-US" sz="1200" dirty="0"/>
+                        <a:t>]</a:t>
+                      </a:r>
+                      <a:r>
+                        <a:rPr lang="en-US" sz="1200" kern="1200" dirty="0">
+                          <a:solidFill>
+                            <a:schemeClr val="dk1"/>
+                          </a:solidFill>
+                          <a:effectLst/>
+                          <a:latin typeface="+mn-lt"/>
+                          <a:ea typeface="+mn-ea"/>
+                          <a:cs typeface="+mn-cs"/>
+                        </a:rPr>
+                        <a:t>)</a:t>
                       </a:r>
                     </a:p>
                     <a:p>
@@ -5350,7 +5441,7 @@
           <p:nvPr>
             <p:extLst>
               <p:ext uri="{D42A27DB-BD31-4B8C-83A1-F6EECF244321}">
-                <p14:modId xmlns:p14="http://schemas.microsoft.com/office/powerpoint/2010/main" val="1351014932"/>
+                <p14:modId xmlns:p14="http://schemas.microsoft.com/office/powerpoint/2010/main" val="4204351656"/>
               </p:ext>
             </p:extLst>
           </p:nvPr>
@@ -6210,7 +6301,7 @@
                           <a:ea typeface="+mn-ea"/>
                           <a:cs typeface="+mn-cs"/>
                         </a:rPr>
-                        <a:t>"%Y-%m-%d %H:%M:%</a:t>
+                        <a:t>'%Y-%m-%d %H:%M:%</a:t>
                       </a:r>
                       <a:r>
                         <a:rPr lang="en-US" sz="1200" kern="1200" dirty="0" err="1">
@@ -6234,7 +6325,39 @@
                           <a:ea typeface="+mn-ea"/>
                           <a:cs typeface="+mn-cs"/>
                         </a:rPr>
-                        <a:t>')[:-6]“)</a:t>
+                        <a:t>'</a:t>
+                      </a:r>
+                      <a:r>
+                        <a:rPr lang="en-US" sz="1200" dirty="0"/>
+                        <a:t>)[:-</a:t>
+                      </a:r>
+                      <a:r>
+                        <a:rPr lang="en-US" sz="1200" kern="1200" dirty="0">
+                          <a:solidFill>
+                            <a:schemeClr val="dk1"/>
+                          </a:solidFill>
+                          <a:effectLst/>
+                          <a:latin typeface="+mn-lt"/>
+                          <a:ea typeface="+mn-ea"/>
+                          <a:cs typeface="+mn-cs"/>
+                        </a:rPr>
+                        <a:t>6</a:t>
+                      </a:r>
+                      <a:r>
+                        <a:rPr lang="en-US" sz="1200" dirty="0"/>
+                        <a:t>]</a:t>
+                      </a:r>
+                      <a:r>
+                        <a:rPr lang="en-US" sz="1200" kern="1200" dirty="0">
+                          <a:solidFill>
+                            <a:schemeClr val="dk1"/>
+                          </a:solidFill>
+                          <a:effectLst/>
+                          <a:latin typeface="+mn-lt"/>
+                          <a:ea typeface="+mn-ea"/>
+                          <a:cs typeface="+mn-cs"/>
+                        </a:rPr>
+                        <a:t>)</a:t>
                       </a:r>
                     </a:p>
                     <a:p>
@@ -6570,7 +6693,7 @@
           <p:nvPr>
             <p:extLst>
               <p:ext uri="{D42A27DB-BD31-4B8C-83A1-F6EECF244321}">
-                <p14:modId xmlns:p14="http://schemas.microsoft.com/office/powerpoint/2010/main" val="432143860"/>
+                <p14:modId xmlns:p14="http://schemas.microsoft.com/office/powerpoint/2010/main" val="846833843"/>
               </p:ext>
             </p:extLst>
           </p:nvPr>
@@ -7484,7 +7607,7 @@
                           <a:ea typeface="+mn-ea"/>
                           <a:cs typeface="+mn-cs"/>
                         </a:rPr>
-                        <a:t>"%Y-%m-%d %H:%M:%</a:t>
+                        <a:t>'%Y-%m-%d %H:%M:%</a:t>
                       </a:r>
                       <a:r>
                         <a:rPr lang="en-US" sz="1200" kern="1200" dirty="0" err="1">
@@ -7508,7 +7631,39 @@
                           <a:ea typeface="+mn-ea"/>
                           <a:cs typeface="+mn-cs"/>
                         </a:rPr>
-                        <a:t>')[:-6]“)</a:t>
+                        <a:t>'</a:t>
+                      </a:r>
+                      <a:r>
+                        <a:rPr lang="en-US" sz="1200" dirty="0"/>
+                        <a:t>)[:-</a:t>
+                      </a:r>
+                      <a:r>
+                        <a:rPr lang="en-US" sz="1200" kern="1200" dirty="0">
+                          <a:solidFill>
+                            <a:schemeClr val="dk1"/>
+                          </a:solidFill>
+                          <a:effectLst/>
+                          <a:latin typeface="+mn-lt"/>
+                          <a:ea typeface="+mn-ea"/>
+                          <a:cs typeface="+mn-cs"/>
+                        </a:rPr>
+                        <a:t>6</a:t>
+                      </a:r>
+                      <a:r>
+                        <a:rPr lang="en-US" sz="1200" dirty="0"/>
+                        <a:t>]</a:t>
+                      </a:r>
+                      <a:r>
+                        <a:rPr lang="en-US" sz="1200" kern="1200" dirty="0">
+                          <a:solidFill>
+                            <a:schemeClr val="dk1"/>
+                          </a:solidFill>
+                          <a:effectLst/>
+                          <a:latin typeface="+mn-lt"/>
+                          <a:ea typeface="+mn-ea"/>
+                          <a:cs typeface="+mn-cs"/>
+                        </a:rPr>
+                        <a:t>)</a:t>
                       </a:r>
                     </a:p>
                     <a:p>

</xml_diff>